<commit_message>
plan de riesgos, y lanzamiento TSP
nuevas actualizaciones tipo ACME
</commit_message>
<xml_diff>
--- a/UPIIZ_PTLL_PresentaciónAprobaciónProyecto.pptx
+++ b/UPIIZ_PTLL_PresentaciónAprobaciónProyecto.pptx
@@ -299,7 +299,7 @@
               <a:pPr>
                 <a:defRPr/>
               </a:pPr>
-              <a:t>20/02/2015</a:t>
+              <a:t>28/02/2015</a:t>
             </a:fld>
             <a:endParaRPr lang="es-ES" dirty="0"/>
           </a:p>
@@ -528,7 +528,7 @@
               <a:pPr>
                 <a:defRPr/>
               </a:pPr>
-              <a:t>20/02/2015</a:t>
+              <a:t>28/02/2015</a:t>
             </a:fld>
             <a:endParaRPr lang="es-PE" dirty="0"/>
           </a:p>
@@ -3750,7 +3750,7 @@
             </a:pPr>
             <a:fld id="{F9809F7D-EFBE-4E36-AF97-BB962693405A}" type="datetime1">
               <a:rPr lang="es-PE" smtClean="0"/>
-              <a:t>20/02/2015</a:t>
+              <a:t>28/02/2015</a:t>
             </a:fld>
             <a:endParaRPr lang="es-PE" dirty="0"/>
           </a:p>
@@ -4275,7 +4275,7 @@
             </a:pPr>
             <a:fld id="{5CDAF9E1-472D-4A44-9B08-BBE78262FB01}" type="datetime1">
               <a:rPr lang="es-PE" smtClean="0"/>
-              <a:t>20/02/2015</a:t>
+              <a:t>28/02/2015</a:t>
             </a:fld>
             <a:endParaRPr lang="es-PE" dirty="0"/>
           </a:p>
@@ -4462,7 +4462,7 @@
             </a:pPr>
             <a:fld id="{FA0A2C37-2FB2-4C2B-82FE-F6662A20B80F}" type="datetime1">
               <a:rPr lang="es-PE" smtClean="0"/>
-              <a:t>20/02/2015</a:t>
+              <a:t>28/02/2015</a:t>
             </a:fld>
             <a:endParaRPr lang="es-PE" dirty="0"/>
           </a:p>
@@ -4639,7 +4639,7 @@
             </a:pPr>
             <a:fld id="{1F15618A-A026-4BAC-8617-237F587F109A}" type="datetime1">
               <a:rPr lang="es-PE" smtClean="0"/>
-              <a:t>20/02/2015</a:t>
+              <a:t>28/02/2015</a:t>
             </a:fld>
             <a:endParaRPr lang="es-PE" dirty="0"/>
           </a:p>
@@ -7775,7 +7775,7 @@
             </a:pPr>
             <a:fld id="{006FA4AC-44AB-4112-A597-3606B41007A1}" type="datetime1">
               <a:rPr lang="es-PE" smtClean="0"/>
-              <a:t>20/02/2015</a:t>
+              <a:t>28/02/2015</a:t>
             </a:fld>
             <a:endParaRPr lang="es-PE" dirty="0"/>
           </a:p>
@@ -8070,7 +8070,7 @@
             </a:pPr>
             <a:fld id="{FF3A5765-A0E9-4FBD-93BE-480E288042BE}" type="datetime1">
               <a:rPr lang="es-PE" smtClean="0"/>
-              <a:t>20/02/2015</a:t>
+              <a:t>28/02/2015</a:t>
             </a:fld>
             <a:endParaRPr lang="es-PE" dirty="0"/>
           </a:p>
@@ -8499,7 +8499,7 @@
             </a:pPr>
             <a:fld id="{55BEDEEC-5B81-489C-9BF2-B17FA3075A63}" type="datetime1">
               <a:rPr lang="es-PE" smtClean="0"/>
-              <a:t>20/02/2015</a:t>
+              <a:t>28/02/2015</a:t>
             </a:fld>
             <a:endParaRPr lang="es-PE" dirty="0"/>
           </a:p>
@@ -8624,7 +8624,7 @@
             </a:pPr>
             <a:fld id="{B2A3756B-5EDE-48B1-B43D-34628AED5446}" type="datetime1">
               <a:rPr lang="es-PE" smtClean="0"/>
-              <a:t>20/02/2015</a:t>
+              <a:t>28/02/2015</a:t>
             </a:fld>
             <a:endParaRPr lang="es-PE" dirty="0"/>
           </a:p>
@@ -8726,7 +8726,7 @@
             </a:pPr>
             <a:fld id="{98648500-D6F6-4AA3-95B2-70F3F6DB99A3}" type="datetime1">
               <a:rPr lang="es-PE" smtClean="0"/>
-              <a:t>20/02/2015</a:t>
+              <a:t>28/02/2015</a:t>
             </a:fld>
             <a:endParaRPr lang="es-PE" dirty="0"/>
           </a:p>
@@ -8913,7 +8913,7 @@
             </a:pPr>
             <a:fld id="{11B73A31-8B39-4763-8621-A6F4D0266947}" type="datetime1">
               <a:rPr lang="es-PE" smtClean="0"/>
-              <a:t>20/02/2015</a:t>
+              <a:t>28/02/2015</a:t>
             </a:fld>
             <a:endParaRPr lang="es-PE" dirty="0"/>
           </a:p>
@@ -9411,7 +9411,7 @@
             </a:pPr>
             <a:fld id="{66B7CDAE-2005-46CC-AB22-795916D5EA86}" type="datetime1">
               <a:rPr lang="es-PE" smtClean="0"/>
-              <a:t>20/02/2015</a:t>
+              <a:t>28/02/2015</a:t>
             </a:fld>
             <a:endParaRPr lang="es-PE" dirty="0"/>
           </a:p>
@@ -9975,7 +9975,7 @@
             </a:pPr>
             <a:fld id="{FB38184B-5436-4A4E-846F-A6C91C33404F}" type="datetime1">
               <a:rPr lang="es-PE" smtClean="0"/>
-              <a:t>20/02/2015</a:t>
+              <a:t>28/02/2015</a:t>
             </a:fld>
             <a:endParaRPr lang="es-PE" dirty="0"/>
           </a:p>
@@ -10460,35 +10460,8 @@
                 <a:latin typeface="Forte" panose="03060902040502070203" pitchFamily="66" charset="0"/>
                 <a:cs typeface="+mn-cs"/>
               </a:rPr>
-              <a:t>		</a:t>
-            </a:r>
-            <a:r>
-              <a:rPr lang="es-ES_tradnl" sz="6000" b="1" dirty="0" smtClean="0">
-                <a:ln>
-                  <a:solidFill>
-                    <a:srgbClr val="00B0F0"/>
-                  </a:solidFill>
-                </a:ln>
-                <a:solidFill>
-                  <a:srgbClr val="002060"/>
-                </a:solidFill>
-                <a:latin typeface="Forte" panose="03060902040502070203" pitchFamily="66" charset="0"/>
-                <a:cs typeface="+mn-cs"/>
-              </a:rPr>
-              <a:t>nutrición</a:t>
-            </a:r>
-            <a:endParaRPr lang="es-ES_tradnl" sz="6000" b="1" dirty="0" smtClean="0">
-              <a:ln>
-                <a:solidFill>
-                  <a:srgbClr val="00B0F0"/>
-                </a:solidFill>
-              </a:ln>
-              <a:solidFill>
-                <a:srgbClr val="002060"/>
-              </a:solidFill>
-              <a:latin typeface="Forte" panose="03060902040502070203" pitchFamily="66" charset="0"/>
-              <a:cs typeface="+mn-cs"/>
-            </a:endParaRPr>
+              <a:t>		nutrición</a:t>
+            </a:r>
           </a:p>
           <a:p>
             <a:pPr>
@@ -10808,23 +10781,7 @@
                   <a:schemeClr val="tx1"/>
                 </a:solidFill>
               </a:rPr>
-              <a:t>Lo </a:t>
-            </a:r>
-            <a:r>
-              <a:rPr lang="es-MX" dirty="0" smtClean="0">
-                <a:solidFill>
-                  <a:schemeClr val="tx1"/>
-                </a:solidFill>
-              </a:rPr>
-              <a:t>escogimos porque  es un modelo que lleva un orden </a:t>
-            </a:r>
-            <a:r>
-              <a:rPr lang="es-MX" dirty="0" smtClean="0">
-                <a:solidFill>
-                  <a:schemeClr val="tx1"/>
-                </a:solidFill>
-              </a:rPr>
-              <a:t>estricto.</a:t>
+              <a:t>Lo escogimos porque  es un modelo que lleva un orden estricto.</a:t>
             </a:r>
           </a:p>
           <a:p>
@@ -10849,15 +10806,7 @@
                   <a:schemeClr val="tx1"/>
                 </a:solidFill>
               </a:rPr>
-              <a:t>Es </a:t>
-            </a:r>
-            <a:r>
-              <a:rPr lang="es-MX" dirty="0" smtClean="0">
-                <a:solidFill>
-                  <a:schemeClr val="tx1"/>
-                </a:solidFill>
-              </a:rPr>
-              <a:t>fácil de hacer correcciones y mejoras al sistema.</a:t>
+              <a:t>Es fácil de hacer correcciones y mejoras al sistema.</a:t>
             </a:r>
           </a:p>
           <a:p>
@@ -11177,7 +11126,7 @@
         </p:nvGraphicFramePr>
         <p:xfrm>
           <a:off x="1475656" y="2492896"/>
-          <a:ext cx="6120680" cy="2299576"/>
+          <a:ext cx="6120680" cy="2377440"/>
         </p:xfrm>
         <a:graphic>
           <a:graphicData uri="http://schemas.openxmlformats.org/drawingml/2006/table">
@@ -12069,8 +12018,8 @@
         </p:nvSpPr>
         <p:spPr>
           <a:xfrm>
-            <a:off x="500063" y="1689100"/>
-            <a:ext cx="8229600" cy="4525963"/>
+            <a:off x="432638" y="908720"/>
+            <a:ext cx="8229600" cy="5030019"/>
           </a:xfrm>
           <a:prstGeom prst="rect">
             <a:avLst/>
@@ -12113,7 +12062,7 @@
         <p:spPr>
           <a:xfrm>
             <a:off x="489627" y="1412776"/>
-            <a:ext cx="7888361" cy="4893647"/>
+            <a:ext cx="7888361" cy="4278094"/>
           </a:xfrm>
           <a:prstGeom prst="rect">
             <a:avLst/>
@@ -12127,7 +12076,7 @@
           <a:p>
             <a:pPr algn="just"/>
             <a:r>
-              <a:rPr lang="es-MX" sz="2400" dirty="0" smtClean="0">
+              <a:rPr lang="es-MX" sz="3200" dirty="0" smtClean="0">
                 <a:ln>
                   <a:solidFill>
                     <a:srgbClr val="00B0F0"/>
@@ -12207,6 +12156,39 @@
               </a:solidFill>
               <a:latin typeface="+mn-lt"/>
             </a:endParaRPr>
+          </a:p>
+          <a:p>
+            <a:pPr algn="just"/>
+            <a:endParaRPr lang="es-MX" sz="2400" dirty="0">
+              <a:solidFill>
+                <a:srgbClr val="FF0000"/>
+              </a:solidFill>
+              <a:latin typeface="+mn-lt"/>
+            </a:endParaRPr>
+          </a:p>
+          <a:p>
+            <a:pPr algn="just"/>
+            <a:r>
+              <a:rPr lang="es-MX" sz="2400" dirty="0">
+                <a:ln>
+                  <a:solidFill>
+                    <a:srgbClr val="00B0F0"/>
+                  </a:solidFill>
+                </a:ln>
+              </a:rPr>
+              <a:t>Contingencia</a:t>
+            </a:r>
+          </a:p>
+          <a:p>
+            <a:pPr marL="285750" indent="-285750" algn="just">
+              <a:buFontTx/>
+              <a:buChar char="-"/>
+            </a:pPr>
+            <a:r>
+              <a:rPr lang="es-ES" sz="2400" dirty="0"/>
+              <a:t>Aprender lo mas amplio posible del manejo de android en horas extraclase.</a:t>
+            </a:r>
+            <a:endParaRPr lang="es-MX" sz="2400" dirty="0"/>
           </a:p>
           <a:p>
             <a:pPr algn="just"/>
@@ -12237,66 +12219,26 @@
               <a:buChar char="-"/>
             </a:pPr>
             <a:r>
-              <a:rPr lang="es-MX" sz="2400" dirty="0" smtClean="0">
+              <a:rPr lang="es-ES" sz="2400" dirty="0">
                 <a:latin typeface="+mn-lt"/>
               </a:rPr>
-              <a:t>Aprender </a:t>
-            </a:r>
-            <a:r>
-              <a:rPr lang="es-MX" sz="2400" dirty="0">
+              <a:t>Se tendrá que </a:t>
+            </a:r>
+            <a:r>
+              <a:rPr lang="es-ES" sz="2400" dirty="0" smtClean="0">
                 <a:latin typeface="+mn-lt"/>
               </a:rPr>
-              <a:t>desarrollo de aplicaciones web en horas fuera de clase</a:t>
-            </a:r>
-            <a:r>
-              <a:rPr lang="es-MX" sz="2400" dirty="0" smtClean="0">
+              <a:t>posponer la </a:t>
+            </a:r>
+            <a:r>
+              <a:rPr lang="es-ES" sz="2400" dirty="0">
                 <a:latin typeface="+mn-lt"/>
               </a:rPr>
-              <a:t>.</a:t>
-            </a:r>
-          </a:p>
-          <a:p>
-            <a:pPr marL="285750" indent="-285750" algn="just">
-              <a:buFontTx/>
-              <a:buChar char="-"/>
-            </a:pPr>
+              <a:t>fecha de entrega.</a:t>
+            </a:r>
             <a:endParaRPr lang="es-MX" sz="2400" dirty="0" smtClean="0">
               <a:latin typeface="+mn-lt"/>
             </a:endParaRPr>
-          </a:p>
-          <a:p>
-            <a:pPr algn="just"/>
-            <a:r>
-              <a:rPr lang="es-MX" sz="2400" dirty="0" smtClean="0">
-                <a:ln>
-                  <a:solidFill>
-                    <a:srgbClr val="00B0F0"/>
-                  </a:solidFill>
-                </a:ln>
-                <a:latin typeface="+mn-lt"/>
-              </a:rPr>
-              <a:t>Contingencia</a:t>
-            </a:r>
-            <a:endParaRPr lang="es-MX" sz="2400" dirty="0">
-              <a:ln>
-                <a:solidFill>
-                  <a:srgbClr val="00B0F0"/>
-                </a:solidFill>
-              </a:ln>
-              <a:latin typeface="+mn-lt"/>
-            </a:endParaRPr>
-          </a:p>
-          <a:p>
-            <a:pPr marL="285750" indent="-285750" algn="just">
-              <a:buFontTx/>
-              <a:buChar char="-"/>
-            </a:pPr>
-            <a:r>
-              <a:rPr lang="es-MX" sz="2400" dirty="0">
-                <a:latin typeface="+mn-lt"/>
-              </a:rPr>
-              <a:t>Una vez disipado este riesgo no se podrá terminar ningún juego móvil a tiempo y se tendrá que postergar la entrega de este.</a:t>
-            </a:r>
           </a:p>
         </p:txBody>
       </p:sp>
@@ -12387,7 +12329,7 @@
         </p:spPr>
         <p:txBody>
           <a:bodyPr>
-            <a:normAutofit fontScale="85000" lnSpcReduction="20000"/>
+            <a:normAutofit fontScale="92500" lnSpcReduction="20000"/>
           </a:bodyPr>
           <a:lstStyle/>
           <a:p>
@@ -12488,9 +12430,9 @@
                   <a:schemeClr val="tx1"/>
                 </a:solidFill>
               </a:rPr>
-              <a:t>Mitigación</a:t>
-            </a:r>
-            <a:endParaRPr lang="es-MX" sz="3500" dirty="0">
+              <a:t>Contingencia</a:t>
+            </a:r>
+            <a:endParaRPr lang="es-MX" sz="3500" dirty="0" smtClean="0">
               <a:ln>
                 <a:solidFill>
                   <a:srgbClr val="00B0F0"/>
@@ -12502,36 +12444,84 @@
             </a:endParaRPr>
           </a:p>
           <a:p>
+            <a:pPr algn="just">
+              <a:buFontTx/>
+              <a:buChar char="-"/>
+            </a:pPr>
+            <a:r>
+              <a:rPr lang="es-ES" sz="3500" dirty="0" smtClean="0">
+                <a:solidFill>
+                  <a:schemeClr val="tx1"/>
+                </a:solidFill>
+              </a:rPr>
+              <a:t>Aprender </a:t>
+            </a:r>
+            <a:r>
+              <a:rPr lang="es-ES" sz="3500" dirty="0">
+                <a:solidFill>
+                  <a:schemeClr val="tx1"/>
+                </a:solidFill>
+              </a:rPr>
+              <a:t>a desarrollar aplicaciones web en horas extraclase</a:t>
+            </a:r>
+            <a:r>
+              <a:rPr lang="es-ES" sz="3500" dirty="0" smtClean="0">
+                <a:solidFill>
+                  <a:schemeClr val="tx1"/>
+                </a:solidFill>
+              </a:rPr>
+              <a:t>.</a:t>
+            </a:r>
+          </a:p>
+          <a:p>
+            <a:pPr algn="just">
+              <a:buFontTx/>
+              <a:buChar char="-"/>
+            </a:pPr>
+            <a:endParaRPr lang="es-ES" sz="3500" dirty="0" smtClean="0">
+              <a:solidFill>
+                <a:schemeClr val="tx1"/>
+              </a:solidFill>
+            </a:endParaRPr>
+          </a:p>
+          <a:p>
             <a:pPr marL="0" indent="0" algn="just">
               <a:buNone/>
             </a:pPr>
             <a:r>
-              <a:rPr lang="es-MX" sz="3500" dirty="0" smtClean="0">
+              <a:rPr lang="es-MX" sz="3500" dirty="0">
+                <a:ln>
+                  <a:solidFill>
+                    <a:srgbClr val="00B0F0"/>
+                  </a:solidFill>
+                </a:ln>
                 <a:solidFill>
                   <a:schemeClr val="tx1"/>
                 </a:solidFill>
               </a:rPr>
-              <a:t>- Aprender </a:t>
-            </a:r>
+              <a:t>Mitigación</a:t>
+            </a:r>
+          </a:p>
+          <a:p>
+            <a:pPr marL="0" indent="0" algn="just">
+              <a:buNone/>
+            </a:pPr>
             <a:r>
               <a:rPr lang="es-MX" sz="3500" dirty="0">
                 <a:solidFill>
                   <a:schemeClr val="tx1"/>
                 </a:solidFill>
               </a:rPr>
-              <a:t>desarrollo de aplicaciones web </a:t>
-            </a:r>
-            <a:r>
-              <a:rPr lang="es-MX" sz="3500" dirty="0" smtClean="0">
+              <a:t>- </a:t>
+            </a:r>
+            <a:r>
+              <a:rPr lang="es-ES" sz="3500" dirty="0">
                 <a:solidFill>
                   <a:schemeClr val="tx1"/>
                 </a:solidFill>
               </a:rPr>
-              <a:t>extra clase.</a:t>
-            </a:r>
-          </a:p>
-          <a:p>
-            <a:pPr algn="just"/>
+              <a:t>No se podrá terminar ningún juego web.</a:t>
+            </a:r>
             <a:endParaRPr lang="es-MX" sz="3500" dirty="0">
               <a:solidFill>
                 <a:schemeClr val="tx1"/>
@@ -12539,43 +12529,15 @@
             </a:endParaRPr>
           </a:p>
           <a:p>
-            <a:pPr marL="0" indent="0" algn="just">
-              <a:buNone/>
-            </a:pPr>
-            <a:r>
-              <a:rPr lang="es-MX" sz="3500" dirty="0" smtClean="0">
-                <a:ln>
-                  <a:solidFill>
-                    <a:srgbClr val="00B0F0"/>
-                  </a:solidFill>
-                </a:ln>
-                <a:solidFill>
-                  <a:schemeClr val="tx1"/>
-                </a:solidFill>
-              </a:rPr>
-              <a:t>Contingencia</a:t>
-            </a:r>
-          </a:p>
-          <a:p>
-            <a:pPr marL="0" indent="0" algn="just">
-              <a:buNone/>
-            </a:pPr>
-            <a:r>
-              <a:rPr lang="es-MX" sz="3500" dirty="0" smtClean="0">
-                <a:solidFill>
-                  <a:schemeClr val="tx1"/>
-                </a:solidFill>
-              </a:rPr>
-              <a:t>- </a:t>
-            </a:r>
-            <a:r>
-              <a:rPr lang="es-MX" sz="3500" dirty="0">
-                <a:solidFill>
-                  <a:schemeClr val="tx1"/>
-                </a:solidFill>
-              </a:rPr>
-              <a:t>Una vez disipado este riesgo no se podrá terminar ningún juego web a tiempo y se tendrá que entregar la entrega de este.</a:t>
-            </a:r>
+            <a:pPr algn="just">
+              <a:buFontTx/>
+              <a:buChar char="-"/>
+            </a:pPr>
+            <a:endParaRPr lang="es-ES" sz="3500" dirty="0" smtClean="0">
+              <a:solidFill>
+                <a:schemeClr val="tx1"/>
+              </a:solidFill>
+            </a:endParaRPr>
           </a:p>
         </p:txBody>
       </p:sp>
@@ -12755,6 +12717,60 @@
               <a:buNone/>
             </a:pPr>
             <a:r>
+              <a:rPr lang="es-MX" sz="2800" dirty="0">
+                <a:ln>
+                  <a:solidFill>
+                    <a:srgbClr val="00B0F0"/>
+                  </a:solidFill>
+                </a:ln>
+                <a:solidFill>
+                  <a:schemeClr val="tx1"/>
+                </a:solidFill>
+              </a:rPr>
+              <a:t>Contingencia</a:t>
+            </a:r>
+            <a:r>
+              <a:rPr lang="es-MX" sz="2800" dirty="0">
+                <a:solidFill>
+                  <a:schemeClr val="tx1"/>
+                </a:solidFill>
+              </a:rPr>
+              <a:t> </a:t>
+            </a:r>
+          </a:p>
+          <a:p>
+            <a:pPr marL="0" indent="0" algn="just">
+              <a:buNone/>
+            </a:pPr>
+            <a:r>
+              <a:rPr lang="es-MX" sz="2800" dirty="0">
+                <a:solidFill>
+                  <a:schemeClr val="tx1"/>
+                </a:solidFill>
+              </a:rPr>
+              <a:t>- Dar prioridad a las tareas con dependencia.</a:t>
+            </a:r>
+          </a:p>
+          <a:p>
+            <a:pPr marL="0" indent="0" algn="just">
+              <a:buNone/>
+            </a:pPr>
+            <a:endParaRPr lang="es-MX" sz="2800" dirty="0" smtClean="0">
+              <a:ln>
+                <a:solidFill>
+                  <a:srgbClr val="00B0F0"/>
+                </a:solidFill>
+              </a:ln>
+              <a:solidFill>
+                <a:schemeClr val="tx1"/>
+              </a:solidFill>
+            </a:endParaRPr>
+          </a:p>
+          <a:p>
+            <a:pPr marL="0" indent="0" algn="just">
+              <a:buNone/>
+            </a:pPr>
+            <a:r>
               <a:rPr lang="es-MX" sz="2800" dirty="0" smtClean="0">
                 <a:ln>
                   <a:solidFill>
@@ -12767,86 +12783,47 @@
               </a:rPr>
               <a:t>Mitigación</a:t>
             </a:r>
-          </a:p>
-          <a:p>
-            <a:pPr marL="0" indent="0" algn="just">
-              <a:buNone/>
-            </a:pPr>
-            <a:r>
-              <a:rPr lang="es-MX" sz="2800" dirty="0" smtClean="0">
+            <a:endParaRPr lang="es-MX" sz="2800" dirty="0" smtClean="0">
+              <a:ln>
+                <a:solidFill>
+                  <a:srgbClr val="00B0F0"/>
+                </a:solidFill>
+              </a:ln>
+              <a:solidFill>
+                <a:schemeClr val="tx1"/>
+              </a:solidFill>
+            </a:endParaRPr>
+          </a:p>
+          <a:p>
+            <a:pPr algn="just">
+              <a:buFontTx/>
+              <a:buChar char="-"/>
+            </a:pPr>
+            <a:r>
+              <a:rPr lang="es-ES" sz="2800" dirty="0" smtClean="0">
                 <a:solidFill>
                   <a:schemeClr val="tx1"/>
                 </a:solidFill>
               </a:rPr>
-              <a:t>- </a:t>
-            </a:r>
-            <a:r>
-              <a:rPr lang="es-MX" sz="2800" dirty="0">
+              <a:t>Finalizar </a:t>
+            </a:r>
+            <a:r>
+              <a:rPr lang="es-ES" sz="2800" dirty="0">
                 <a:solidFill>
                   <a:schemeClr val="tx1"/>
                 </a:solidFill>
               </a:rPr>
-              <a:t>Dar prioridad a las tareas con dependencia</a:t>
-            </a:r>
-            <a:r>
-              <a:rPr lang="es-MX" sz="2800" dirty="0" smtClean="0">
-                <a:solidFill>
-                  <a:schemeClr val="tx1"/>
-                </a:solidFill>
-              </a:rPr>
-              <a:t>.</a:t>
-            </a:r>
+              <a:t>la tareas lo más pronto posible, para continuar con la tarea que se debe de realizar después.</a:t>
+            </a:r>
+            <a:endParaRPr lang="es-MX" sz="2800" dirty="0" smtClean="0">
+              <a:solidFill>
+                <a:schemeClr val="tx1"/>
+              </a:solidFill>
+            </a:endParaRPr>
           </a:p>
           <a:p>
             <a:pPr algn="just"/>
             <a:endParaRPr lang="es-MX" sz="2800" dirty="0"/>
-          </a:p>
-          <a:p>
-            <a:pPr marL="0" indent="0" algn="just">
-              <a:buNone/>
-            </a:pPr>
-            <a:r>
-              <a:rPr lang="es-MX" sz="2800" dirty="0" smtClean="0">
-                <a:ln>
-                  <a:solidFill>
-                    <a:srgbClr val="00B0F0"/>
-                  </a:solidFill>
-                </a:ln>
-                <a:solidFill>
-                  <a:schemeClr val="tx1"/>
-                </a:solidFill>
-              </a:rPr>
-              <a:t>Contingencia</a:t>
-            </a:r>
-            <a:r>
-              <a:rPr lang="es-MX" sz="2800" dirty="0" smtClean="0">
-                <a:solidFill>
-                  <a:schemeClr val="tx1"/>
-                </a:solidFill>
-              </a:rPr>
-              <a:t> </a:t>
-            </a:r>
-          </a:p>
-          <a:p>
-            <a:pPr marL="0" indent="0" algn="just">
-              <a:buNone/>
-            </a:pPr>
-            <a:r>
-              <a:rPr lang="es-MX" sz="2800" dirty="0" smtClean="0">
-                <a:solidFill>
-                  <a:schemeClr val="tx1"/>
-                </a:solidFill>
-              </a:rPr>
-              <a:t>- </a:t>
-            </a:r>
-            <a:r>
-              <a:rPr lang="es-MX" sz="2800" dirty="0">
-                <a:solidFill>
-                  <a:schemeClr val="tx1"/>
-                </a:solidFill>
-              </a:rPr>
-              <a:t>Realizar tareas de las cuales se depende lo más pronto posible, para seguir con la tarea que se debe de realizar después.</a:t>
-            </a:r>
           </a:p>
         </p:txBody>
       </p:sp>
@@ -13047,7 +13024,7 @@
                   <a:schemeClr val="tx1"/>
                 </a:solidFill>
               </a:rPr>
-              <a:t>Mitigación</a:t>
+              <a:t>Contingencia</a:t>
             </a:r>
           </a:p>
           <a:p>
@@ -13055,44 +13032,68 @@
               <a:buNone/>
             </a:pPr>
             <a:r>
+              <a:rPr lang="es-MX" sz="2800" dirty="0">
+                <a:solidFill>
+                  <a:schemeClr val="tx1"/>
+                </a:solidFill>
+              </a:rPr>
+              <a:t>- Hacer los prototipos que cumplan con la mayoría de los requisitos propuestos por el cliente.</a:t>
+            </a:r>
+          </a:p>
+          <a:p>
+            <a:pPr marL="0" indent="0" algn="just">
+              <a:buNone/>
+            </a:pPr>
+            <a:endParaRPr lang="es-MX" sz="2800" dirty="0" smtClean="0">
+              <a:ln>
+                <a:solidFill>
+                  <a:srgbClr val="00B0F0"/>
+                </a:solidFill>
+              </a:ln>
+              <a:solidFill>
+                <a:schemeClr val="tx1"/>
+              </a:solidFill>
+            </a:endParaRPr>
+          </a:p>
+          <a:p>
+            <a:pPr marL="0" indent="0" algn="just">
+              <a:buNone/>
+            </a:pPr>
+            <a:r>
               <a:rPr lang="es-MX" sz="2800" dirty="0" smtClean="0">
+                <a:ln>
+                  <a:solidFill>
+                    <a:srgbClr val="00B0F0"/>
+                  </a:solidFill>
+                </a:ln>
                 <a:solidFill>
                   <a:schemeClr val="tx1"/>
                 </a:solidFill>
               </a:rPr>
-              <a:t>- </a:t>
-            </a:r>
+              <a:t>Mitigación</a:t>
+            </a:r>
+            <a:endParaRPr lang="es-MX" sz="2800" dirty="0" smtClean="0">
+              <a:ln>
+                <a:solidFill>
+                  <a:srgbClr val="00B0F0"/>
+                </a:solidFill>
+              </a:ln>
+              <a:solidFill>
+                <a:schemeClr val="tx1"/>
+              </a:solidFill>
+            </a:endParaRPr>
+          </a:p>
+          <a:p>
+            <a:pPr marL="0" indent="0" algn="just">
+              <a:buNone/>
+            </a:pPr>
             <a:r>
               <a:rPr lang="es-MX" sz="2800" dirty="0">
                 <a:solidFill>
                   <a:schemeClr val="tx1"/>
                 </a:solidFill>
               </a:rPr>
-              <a:t>Hacer los prototipos que cumplan con la </a:t>
-            </a:r>
-            <a:r>
-              <a:rPr lang="es-MX" sz="2800" dirty="0" smtClean="0">
-                <a:solidFill>
-                  <a:schemeClr val="tx1"/>
-                </a:solidFill>
-              </a:rPr>
-              <a:t>mayoría </a:t>
-            </a:r>
-            <a:r>
-              <a:rPr lang="es-MX" sz="2800" dirty="0">
-                <a:solidFill>
-                  <a:schemeClr val="tx1"/>
-                </a:solidFill>
-              </a:rPr>
-              <a:t>de los requisitos propuestos por el cliente</a:t>
-            </a:r>
-            <a:r>
-              <a:rPr lang="es-MX" sz="2800" dirty="0" smtClean="0">
-                <a:solidFill>
-                  <a:schemeClr val="tx1"/>
-                </a:solidFill>
-              </a:rPr>
-              <a:t>.</a:t>
+              <a:t>- Volver a hacer nuevos prototipos.</a:t>
             </a:r>
           </a:p>
           <a:p>
@@ -13102,45 +13103,6 @@
                 <a:schemeClr val="tx1"/>
               </a:solidFill>
             </a:endParaRPr>
-          </a:p>
-          <a:p>
-            <a:pPr marL="0" indent="0" algn="just">
-              <a:buNone/>
-            </a:pPr>
-            <a:r>
-              <a:rPr lang="es-MX" sz="2800" dirty="0" smtClean="0">
-                <a:ln>
-                  <a:solidFill>
-                    <a:srgbClr val="00B0F0"/>
-                  </a:solidFill>
-                </a:ln>
-                <a:solidFill>
-                  <a:schemeClr val="tx1"/>
-                </a:solidFill>
-              </a:rPr>
-              <a:t>Contingencia</a:t>
-            </a:r>
-          </a:p>
-          <a:p>
-            <a:pPr marL="0" indent="0" algn="just">
-              <a:buNone/>
-            </a:pPr>
-            <a:r>
-              <a:rPr lang="es-MX" sz="2800" dirty="0" smtClean="0">
-                <a:solidFill>
-                  <a:schemeClr val="tx1"/>
-                </a:solidFill>
-              </a:rPr>
-              <a:t>- Volver </a:t>
-            </a:r>
-            <a:r>
-              <a:rPr lang="es-MX" sz="2800" dirty="0">
-                <a:solidFill>
-                  <a:schemeClr val="tx1"/>
-                </a:solidFill>
-              </a:rPr>
-              <a:t>a hacer nuevos prototipos.</a:t>
-            </a:r>
           </a:p>
         </p:txBody>
       </p:sp>
@@ -14814,7 +14776,7 @@
         </p:spPr>
         <p:txBody>
           <a:bodyPr>
-            <a:normAutofit/>
+            <a:normAutofit lnSpcReduction="10000"/>
           </a:bodyPr>
           <a:lstStyle/>
           <a:p>
@@ -15295,7 +15257,7 @@
         </p:spPr>
         <p:txBody>
           <a:bodyPr>
-            <a:normAutofit/>
+            <a:normAutofit fontScale="92500" lnSpcReduction="10000"/>
           </a:bodyPr>
           <a:lstStyle/>
           <a:p>
@@ -15346,14 +15308,7 @@
                 <a:latin typeface="+mn-lt"/>
                 <a:cs typeface="+mn-cs"/>
               </a:rPr>
-              <a:t>En </a:t>
-            </a:r>
-            <a:r>
-              <a:rPr lang="es-MX" sz="2800" dirty="0" smtClean="0">
-                <a:latin typeface="+mn-lt"/>
-                <a:cs typeface="+mn-cs"/>
-              </a:rPr>
-              <a:t>total son tres juegos: un memorama de cereales, un ahorcado de carnes y un rompecabezas de frutas.</a:t>
+              <a:t>En total son tres juegos: un memorama de cereales, un ahorcado de carnes y un rompecabezas de frutas.</a:t>
             </a:r>
           </a:p>
           <a:p>
@@ -15386,14 +15341,7 @@
                 <a:latin typeface="+mn-lt"/>
                 <a:cs typeface="+mn-cs"/>
               </a:rPr>
-              <a:t>La </a:t>
-            </a:r>
-            <a:r>
-              <a:rPr lang="es-MX" sz="2800" dirty="0" smtClean="0">
-                <a:latin typeface="+mn-lt"/>
-                <a:cs typeface="+mn-cs"/>
-              </a:rPr>
-              <a:t>estimación de este proyecto esta planeada para finalizar el 6 de Mayo del año en curso. </a:t>
+              <a:t>La estimación de este proyecto esta planeada para finalizar el 6 de Mayo del año en curso. </a:t>
             </a:r>
             <a:endParaRPr lang="es-ES_tradnl" sz="2800" dirty="0">
               <a:latin typeface="+mn-lt"/>

</xml_diff>